<commit_message>
Finished the presentation strucutre. (To be reviewed)
</commit_message>
<xml_diff>
--- a/ideas/JudgePresentation.pptx
+++ b/ideas/JudgePresentation.pptx
@@ -6948,7 +6948,7 @@
         <p:spPr>
           <a:xfrm>
             <a:off x="6607966" y="976544"/>
-            <a:ext cx="5403519" cy="5710560"/>
+            <a:ext cx="5584034" cy="5710560"/>
           </a:xfrm>
         </p:spPr>
         <p:txBody>
@@ -6959,8 +6959,57 @@
           <a:p>
             <a:r>
               <a:rPr lang="en-GB" dirty="0"/>
-              <a:t>Potential Scenario</a:t>
-            </a:r>
+              <a:t>Ideal Scenario</a:t>
+            </a:r>
+          </a:p>
+          <a:p>
+            <a:pPr lvl="1"/>
+            <a:r>
+              <a:rPr lang="en-GB" dirty="0"/>
+              <a:t>A person registers a case with an organisation.</a:t>
+            </a:r>
+          </a:p>
+          <a:p>
+            <a:pPr lvl="1"/>
+            <a:r>
+              <a:rPr lang="en-GB" dirty="0"/>
+              <a:t>The organisation then creates a case on the application</a:t>
+            </a:r>
+          </a:p>
+          <a:p>
+            <a:pPr lvl="1"/>
+            <a:r>
+              <a:rPr lang="en-GB" dirty="0"/>
+              <a:t>A set of users choose to invest time/money into the case</a:t>
+            </a:r>
+          </a:p>
+          <a:p>
+            <a:pPr lvl="1"/>
+            <a:r>
+              <a:rPr lang="en-GB" dirty="0"/>
+              <a:t>The target for the case is reached.</a:t>
+            </a:r>
+          </a:p>
+          <a:p>
+            <a:pPr lvl="1"/>
+            <a:r>
+              <a:rPr lang="en-GB" dirty="0"/>
+              <a:t>The individual registered with the case has got the help needed to get their life back on track.</a:t>
+            </a:r>
+          </a:p>
+          <a:p>
+            <a:pPr lvl="1"/>
+            <a:r>
+              <a:rPr lang="en-GB" dirty="0"/>
+              <a:t>The individuals are updated with the progress of </a:t>
+            </a:r>
+            <a:r>
+              <a:rPr lang="en-GB"/>
+              <a:t>the individual</a:t>
+            </a:r>
+          </a:p>
+          <a:p>
+            <a:pPr lvl="1"/>
             <a:endParaRPr lang="en-MT" dirty="0"/>
           </a:p>
         </p:txBody>

</xml_diff>